<commit_message>
<:/code> - Development Program
</commit_message>
<xml_diff>
--- a/startups/gonnatinfo2000/Apresentação1.pptx
+++ b/startups/gonnatinfo2000/Apresentação1.pptx
@@ -104,6 +104,11 @@
       </a:defRPr>
     </a:lvl9pPr>
   </p:defaultTextStyle>
+  <p:extLst>
+    <p:ext uri="{EFAFB233-063F-42B5-8137-9DF3F51BA10A}">
+      <p15:sldGuideLst xmlns:p15="http://schemas.microsoft.com/office/powerpoint/2012/main"/>
+    </p:ext>
+  </p:extLst>
 </p:presentation>
 </file>
 
@@ -254,7 +259,7 @@
           <a:p>
             <a:fld id="{08A844C9-327B-44E8-B9CE-78858F84A71D}" type="datetimeFigureOut">
               <a:rPr lang="pt-PT" smtClean="0"/>
-              <a:t>05/01/2020</a:t>
+              <a:t>08/01/2020</a:t>
             </a:fld>
             <a:endParaRPr lang="pt-PT"/>
           </a:p>
@@ -452,7 +457,7 @@
           <a:p>
             <a:fld id="{08A844C9-327B-44E8-B9CE-78858F84A71D}" type="datetimeFigureOut">
               <a:rPr lang="pt-PT" smtClean="0"/>
-              <a:t>05/01/2020</a:t>
+              <a:t>08/01/2020</a:t>
             </a:fld>
             <a:endParaRPr lang="pt-PT"/>
           </a:p>
@@ -660,7 +665,7 @@
           <a:p>
             <a:fld id="{08A844C9-327B-44E8-B9CE-78858F84A71D}" type="datetimeFigureOut">
               <a:rPr lang="pt-PT" smtClean="0"/>
-              <a:t>05/01/2020</a:t>
+              <a:t>08/01/2020</a:t>
             </a:fld>
             <a:endParaRPr lang="pt-PT"/>
           </a:p>
@@ -858,7 +863,7 @@
           <a:p>
             <a:fld id="{08A844C9-327B-44E8-B9CE-78858F84A71D}" type="datetimeFigureOut">
               <a:rPr lang="pt-PT" smtClean="0"/>
-              <a:t>05/01/2020</a:t>
+              <a:t>08/01/2020</a:t>
             </a:fld>
             <a:endParaRPr lang="pt-PT"/>
           </a:p>
@@ -1133,7 +1138,7 @@
           <a:p>
             <a:fld id="{08A844C9-327B-44E8-B9CE-78858F84A71D}" type="datetimeFigureOut">
               <a:rPr lang="pt-PT" smtClean="0"/>
-              <a:t>05/01/2020</a:t>
+              <a:t>08/01/2020</a:t>
             </a:fld>
             <a:endParaRPr lang="pt-PT"/>
           </a:p>
@@ -1398,7 +1403,7 @@
           <a:p>
             <a:fld id="{08A844C9-327B-44E8-B9CE-78858F84A71D}" type="datetimeFigureOut">
               <a:rPr lang="pt-PT" smtClean="0"/>
-              <a:t>05/01/2020</a:t>
+              <a:t>08/01/2020</a:t>
             </a:fld>
             <a:endParaRPr lang="pt-PT"/>
           </a:p>
@@ -1810,7 +1815,7 @@
           <a:p>
             <a:fld id="{08A844C9-327B-44E8-B9CE-78858F84A71D}" type="datetimeFigureOut">
               <a:rPr lang="pt-PT" smtClean="0"/>
-              <a:t>05/01/2020</a:t>
+              <a:t>08/01/2020</a:t>
             </a:fld>
             <a:endParaRPr lang="pt-PT"/>
           </a:p>
@@ -1951,7 +1956,7 @@
           <a:p>
             <a:fld id="{08A844C9-327B-44E8-B9CE-78858F84A71D}" type="datetimeFigureOut">
               <a:rPr lang="pt-PT" smtClean="0"/>
-              <a:t>05/01/2020</a:t>
+              <a:t>08/01/2020</a:t>
             </a:fld>
             <a:endParaRPr lang="pt-PT"/>
           </a:p>
@@ -2064,7 +2069,7 @@
           <a:p>
             <a:fld id="{08A844C9-327B-44E8-B9CE-78858F84A71D}" type="datetimeFigureOut">
               <a:rPr lang="pt-PT" smtClean="0"/>
-              <a:t>05/01/2020</a:t>
+              <a:t>08/01/2020</a:t>
             </a:fld>
             <a:endParaRPr lang="pt-PT"/>
           </a:p>
@@ -2375,7 +2380,7 @@
           <a:p>
             <a:fld id="{08A844C9-327B-44E8-B9CE-78858F84A71D}" type="datetimeFigureOut">
               <a:rPr lang="pt-PT" smtClean="0"/>
-              <a:t>05/01/2020</a:t>
+              <a:t>08/01/2020</a:t>
             </a:fld>
             <a:endParaRPr lang="pt-PT"/>
           </a:p>
@@ -2663,7 +2668,7 @@
           <a:p>
             <a:fld id="{08A844C9-327B-44E8-B9CE-78858F84A71D}" type="datetimeFigureOut">
               <a:rPr lang="pt-PT" smtClean="0"/>
-              <a:t>05/01/2020</a:t>
+              <a:t>08/01/2020</a:t>
             </a:fld>
             <a:endParaRPr lang="pt-PT"/>
           </a:p>
@@ -2904,7 +2909,7 @@
           <a:p>
             <a:fld id="{08A844C9-327B-44E8-B9CE-78858F84A71D}" type="datetimeFigureOut">
               <a:rPr lang="pt-PT" smtClean="0"/>
-              <a:t>05/01/2020</a:t>
+              <a:t>08/01/2020</a:t>
             </a:fld>
             <a:endParaRPr lang="pt-PT"/>
           </a:p>
@@ -3390,19 +3395,13 @@
       </p:pic>
       <p:pic>
         <p:nvPicPr>
-          <p:cNvPr id="7" name="Imagem 6" descr="Uma imagem com captura de ecrã, sentado, telefone&#10;&#10;Descrição gerada automaticamente">
-            <a:extLst>
-              <a:ext uri="{FF2B5EF4-FFF2-40B4-BE49-F238E27FC236}">
-                <a16:creationId xmlns:a16="http://schemas.microsoft.com/office/drawing/2014/main" id="{0732A24E-5B01-4C4F-B220-2375A224A460}"/>
-              </a:ext>
-            </a:extLst>
-          </p:cNvPr>
+          <p:cNvPr id="2" name="Imagem 1"/>
           <p:cNvPicPr>
             <a:picLocks noChangeAspect="1"/>
           </p:cNvPicPr>
           <p:nvPr/>
         </p:nvPicPr>
-        <p:blipFill>
+        <p:blipFill rotWithShape="1">
           <a:blip r:embed="rId4">
             <a:extLst>
               <a:ext uri="{28A0092B-C50C-407E-A947-70E740481C1C}">
@@ -3410,14 +3409,13 @@
               </a:ext>
             </a:extLst>
           </a:blip>
-          <a:stretch>
-            <a:fillRect/>
-          </a:stretch>
+          <a:srcRect l="29521"/>
+          <a:stretch/>
         </p:blipFill>
         <p:spPr>
           <a:xfrm>
-            <a:off x="-12886939" y="-9311746"/>
-            <a:ext cx="21998082" cy="16960580"/>
+            <a:off x="26670464" y="8118389"/>
+            <a:ext cx="21986864" cy="17482936"/>
           </a:xfrm>
           <a:prstGeom prst="rect">
             <a:avLst/>
@@ -3426,13 +3424,7 @@
       </p:pic>
       <p:pic>
         <p:nvPicPr>
-          <p:cNvPr id="9" name="Imagem 8" descr="Uma imagem com captura de ecrã, preto, ecrã, monitor&#10;&#10;Descrição gerada automaticamente">
-            <a:extLst>
-              <a:ext uri="{FF2B5EF4-FFF2-40B4-BE49-F238E27FC236}">
-                <a16:creationId xmlns:a16="http://schemas.microsoft.com/office/drawing/2014/main" id="{98D259B9-5C06-4FF7-B233-7C9B5B6045C2}"/>
-              </a:ext>
-            </a:extLst>
-          </p:cNvPr>
+          <p:cNvPr id="3" name="Imagem 2"/>
           <p:cNvPicPr>
             <a:picLocks noChangeAspect="1"/>
           </p:cNvPicPr>
@@ -3446,17 +3438,124 @@
               </a:ext>
             </a:extLst>
           </a:blip>
-          <a:srcRect t="25339"/>
+          <a:srcRect t="-465" b="76443"/>
           <a:stretch/>
         </p:blipFill>
         <p:spPr>
           <a:xfrm>
-            <a:off x="4661164" y="-134160"/>
-            <a:ext cx="22009300" cy="7126320"/>
+            <a:off x="9881196" y="-12458700"/>
+            <a:ext cx="21975647" cy="2457450"/>
           </a:xfrm>
           <a:prstGeom prst="rect">
             <a:avLst/>
           </a:prstGeom>
+        </p:spPr>
+      </p:pic>
+      <p:pic>
+        <p:nvPicPr>
+          <p:cNvPr id="8" name="Imagem 7"/>
+          <p:cNvPicPr>
+            <a:picLocks noChangeAspect="1"/>
+          </p:cNvPicPr>
+          <p:nvPr/>
+        </p:nvPicPr>
+        <p:blipFill rotWithShape="1">
+          <a:blip r:embed="rId6">
+            <a:extLst>
+              <a:ext uri="{28A0092B-C50C-407E-A947-70E740481C1C}">
+                <a14:useLocalDpi xmlns:a14="http://schemas.microsoft.com/office/drawing/2010/main" val="0"/>
+              </a:ext>
+            </a:extLst>
+          </a:blip>
+          <a:srcRect l="9557" t="44460" r="8596" b="34214"/>
+          <a:stretch/>
+        </p:blipFill>
+        <p:spPr>
+          <a:xfrm>
+            <a:off x="17619943" y="-5513053"/>
+            <a:ext cx="21986864" cy="3582490"/>
+          </a:xfrm>
+          <a:prstGeom prst="rect">
+            <a:avLst/>
+          </a:prstGeom>
+        </p:spPr>
+      </p:pic>
+      <p:pic>
+        <p:nvPicPr>
+          <p:cNvPr id="1026" name="Picture 2" descr="Resultado de imagem para css programming"/>
+          <p:cNvPicPr>
+            <a:picLocks noChangeAspect="1" noChangeArrowheads="1"/>
+          </p:cNvPicPr>
+          <p:nvPr/>
+        </p:nvPicPr>
+        <p:blipFill rotWithShape="1">
+          <a:blip r:embed="rId7">
+            <a:extLst>
+              <a:ext uri="{28A0092B-C50C-407E-A947-70E740481C1C}">
+                <a14:useLocalDpi xmlns:a14="http://schemas.microsoft.com/office/drawing/2010/main" val="0"/>
+              </a:ext>
+            </a:extLst>
+          </a:blip>
+          <a:srcRect t="9340" b="71612"/>
+          <a:stretch/>
+        </p:blipFill>
+        <p:spPr bwMode="auto">
+          <a:xfrm>
+            <a:off x="16134043" y="4343400"/>
+            <a:ext cx="22009300" cy="5029200"/>
+          </a:xfrm>
+          <a:prstGeom prst="rect">
+            <a:avLst/>
+          </a:prstGeom>
+          <a:noFill/>
+          <a:extLst>
+            <a:ext uri="{909E8E84-426E-40DD-AFC4-6F175D3DCCD1}">
+              <a14:hiddenFill xmlns:a14="http://schemas.microsoft.com/office/drawing/2010/main">
+                <a:solidFill>
+                  <a:srgbClr val="FFFFFF"/>
+                </a:solidFill>
+              </a14:hiddenFill>
+            </a:ext>
+          </a:extLst>
+        </p:spPr>
+      </p:pic>
+      <p:pic>
+        <p:nvPicPr>
+          <p:cNvPr id="1030" name="Picture 6" descr="Resultado de imagem para javascript programming"/>
+          <p:cNvPicPr>
+            <a:picLocks noChangeAspect="1" noChangeArrowheads="1"/>
+          </p:cNvPicPr>
+          <p:nvPr/>
+        </p:nvPicPr>
+        <p:blipFill rotWithShape="1">
+          <a:blip r:embed="rId8">
+            <a:extLst>
+              <a:ext uri="{28A0092B-C50C-407E-A947-70E740481C1C}">
+                <a14:useLocalDpi xmlns:a14="http://schemas.microsoft.com/office/drawing/2010/main" val="0"/>
+              </a:ext>
+            </a:extLst>
+          </a:blip>
+          <a:srcRect t="37635" b="35531"/>
+          <a:stretch/>
+        </p:blipFill>
+        <p:spPr bwMode="auto">
+          <a:xfrm>
+            <a:off x="-12875721" y="3570963"/>
+            <a:ext cx="21998082" cy="4053276"/>
+          </a:xfrm>
+          <a:prstGeom prst="rect">
+            <a:avLst/>
+          </a:prstGeom>
+          <a:noFill/>
+          <a:extLst>
+            <a:ext uri="{909E8E84-426E-40DD-AFC4-6F175D3DCCD1}">
+              <a14:hiddenFill xmlns:a14="http://schemas.microsoft.com/office/drawing/2010/main">
+                <a:solidFill>
+                  <a:srgbClr val="FFFFFF"/>
+                </a:solidFill>
+              </a14:hiddenFill>
+            </a:ext>
+          </a:extLst>
         </p:spPr>
       </p:pic>
     </p:spTree>

</xml_diff>